<commit_message>
add figs Ch2: Protocol
</commit_message>
<xml_diff>
--- a/Resource/Part1.Technology/Chapter2.Protocol/1.2.2-keyAgree.pptx
+++ b/Resource/Part1.Technology/Chapter2.Protocol/1.2.2-keyAgree.pptx
@@ -216,7 +216,7 @@
           <a:p>
             <a:fld id="{10796A2E-5A39-4436-92C7-3B7DE13A10C0}" type="datetimeFigureOut">
               <a:rPr kumimoji="1" lang="ja-JP" altLang="en-US" smtClean="0"/>
-              <a:t>2021/2/3</a:t>
+              <a:t>2021/2/26</a:t>
             </a:fld>
             <a:endParaRPr kumimoji="1" lang="ja-JP" altLang="en-US"/>
           </a:p>
@@ -1282,7 +1282,7 @@
           <a:p>
             <a:fld id="{72E45FA7-3C44-43F0-BD92-68414C36C835}" type="datetimeFigureOut">
               <a:rPr kumimoji="1" lang="ja-JP" altLang="en-US" smtClean="0"/>
-              <a:t>2021/2/3</a:t>
+              <a:t>2021/2/26</a:t>
             </a:fld>
             <a:endParaRPr kumimoji="1" lang="ja-JP" altLang="en-US"/>
           </a:p>
@@ -1512,7 +1512,7 @@
           <a:p>
             <a:fld id="{72E45FA7-3C44-43F0-BD92-68414C36C835}" type="datetimeFigureOut">
               <a:rPr kumimoji="1" lang="ja-JP" altLang="en-US" smtClean="0"/>
-              <a:t>2021/2/3</a:t>
+              <a:t>2021/2/26</a:t>
             </a:fld>
             <a:endParaRPr kumimoji="1" lang="ja-JP" altLang="en-US"/>
           </a:p>
@@ -1752,7 +1752,7 @@
           <a:p>
             <a:fld id="{72E45FA7-3C44-43F0-BD92-68414C36C835}" type="datetimeFigureOut">
               <a:rPr kumimoji="1" lang="ja-JP" altLang="en-US" smtClean="0"/>
-              <a:t>2021/2/3</a:t>
+              <a:t>2021/2/26</a:t>
             </a:fld>
             <a:endParaRPr kumimoji="1" lang="ja-JP" altLang="en-US"/>
           </a:p>
@@ -2612,7 +2612,7 @@
           <a:p>
             <a:fld id="{72E45FA7-3C44-43F0-BD92-68414C36C835}" type="datetimeFigureOut">
               <a:rPr kumimoji="1" lang="ja-JP" altLang="en-US" smtClean="0"/>
-              <a:t>2021/2/3</a:t>
+              <a:t>2021/2/26</a:t>
             </a:fld>
             <a:endParaRPr kumimoji="1" lang="ja-JP" altLang="en-US"/>
           </a:p>
@@ -2887,7 +2887,7 @@
           <a:p>
             <a:fld id="{72E45FA7-3C44-43F0-BD92-68414C36C835}" type="datetimeFigureOut">
               <a:rPr kumimoji="1" lang="ja-JP" altLang="en-US" smtClean="0"/>
-              <a:t>2021/2/3</a:t>
+              <a:t>2021/2/26</a:t>
             </a:fld>
             <a:endParaRPr kumimoji="1" lang="ja-JP" altLang="en-US"/>
           </a:p>
@@ -3216,7 +3216,7 @@
           <a:p>
             <a:fld id="{72E45FA7-3C44-43F0-BD92-68414C36C835}" type="datetimeFigureOut">
               <a:rPr kumimoji="1" lang="ja-JP" altLang="en-US" smtClean="0"/>
-              <a:t>2021/2/3</a:t>
+              <a:t>2021/2/26</a:t>
             </a:fld>
             <a:endParaRPr kumimoji="1" lang="ja-JP" altLang="en-US"/>
           </a:p>
@@ -3692,7 +3692,7 @@
           <a:p>
             <a:fld id="{72E45FA7-3C44-43F0-BD92-68414C36C835}" type="datetimeFigureOut">
               <a:rPr kumimoji="1" lang="ja-JP" altLang="en-US" smtClean="0"/>
-              <a:t>2021/2/3</a:t>
+              <a:t>2021/2/26</a:t>
             </a:fld>
             <a:endParaRPr kumimoji="1" lang="ja-JP" altLang="en-US"/>
           </a:p>
@@ -3833,7 +3833,7 @@
           <a:p>
             <a:fld id="{72E45FA7-3C44-43F0-BD92-68414C36C835}" type="datetimeFigureOut">
               <a:rPr kumimoji="1" lang="ja-JP" altLang="en-US" smtClean="0"/>
-              <a:t>2021/2/3</a:t>
+              <a:t>2021/2/26</a:t>
             </a:fld>
             <a:endParaRPr kumimoji="1" lang="ja-JP" altLang="en-US"/>
           </a:p>
@@ -3946,7 +3946,7 @@
           <a:p>
             <a:fld id="{72E45FA7-3C44-43F0-BD92-68414C36C835}" type="datetimeFigureOut">
               <a:rPr kumimoji="1" lang="ja-JP" altLang="en-US" smtClean="0"/>
-              <a:t>2021/2/3</a:t>
+              <a:t>2021/2/26</a:t>
             </a:fld>
             <a:endParaRPr kumimoji="1" lang="ja-JP" altLang="en-US"/>
           </a:p>
@@ -4289,7 +4289,7 @@
           <a:p>
             <a:fld id="{72E45FA7-3C44-43F0-BD92-68414C36C835}" type="datetimeFigureOut">
               <a:rPr kumimoji="1" lang="ja-JP" altLang="en-US" smtClean="0"/>
-              <a:t>2021/2/3</a:t>
+              <a:t>2021/2/26</a:t>
             </a:fld>
             <a:endParaRPr kumimoji="1" lang="ja-JP" altLang="en-US"/>
           </a:p>
@@ -4577,7 +4577,7 @@
           <a:p>
             <a:fld id="{72E45FA7-3C44-43F0-BD92-68414C36C835}" type="datetimeFigureOut">
               <a:rPr kumimoji="1" lang="ja-JP" altLang="en-US" smtClean="0"/>
-              <a:t>2021/2/3</a:t>
+              <a:t>2021/2/26</a:t>
             </a:fld>
             <a:endParaRPr kumimoji="1" lang="ja-JP" altLang="en-US"/>
           </a:p>
@@ -4850,7 +4850,7 @@
           <a:p>
             <a:fld id="{72E45FA7-3C44-43F0-BD92-68414C36C835}" type="datetimeFigureOut">
               <a:rPr kumimoji="1" lang="ja-JP" altLang="en-US" smtClean="0"/>
-              <a:t>2021/2/3</a:t>
+              <a:t>2021/2/26</a:t>
             </a:fld>
             <a:endParaRPr kumimoji="1" lang="ja-JP" altLang="en-US"/>
           </a:p>
@@ -16627,8 +16627,8 @@
         </p:nvSpPr>
         <p:spPr>
           <a:xfrm>
-            <a:off x="1736895" y="2086962"/>
-            <a:ext cx="3485157" cy="1865089"/>
+            <a:off x="1735546" y="1479092"/>
+            <a:ext cx="3485157" cy="2082091"/>
           </a:xfrm>
           <a:prstGeom prst="roundRect">
             <a:avLst>
@@ -16918,8 +16918,8 @@
         </p:nvSpPr>
         <p:spPr>
           <a:xfrm>
-            <a:off x="6859298" y="2068500"/>
-            <a:ext cx="3485157" cy="1889143"/>
+            <a:off x="6859298" y="1963321"/>
+            <a:ext cx="3485157" cy="2082091"/>
           </a:xfrm>
           <a:prstGeom prst="roundRect">
             <a:avLst>
@@ -17095,42 +17095,6 @@
               <a:t>HKDF</a:t>
             </a:r>
             <a:endParaRPr kumimoji="1" lang="ja-JP" altLang="en-US" sz="1600" b="1"/>
-          </a:p>
-        </p:txBody>
-      </p:sp>
-      <p:sp>
-        <p:nvSpPr>
-          <p:cNvPr id="29" name="テキスト ボックス 28">
-            <a:extLst>
-              <a:ext uri="{FF2B5EF4-FFF2-40B4-BE49-F238E27FC236}">
-                <a16:creationId xmlns:a16="http://schemas.microsoft.com/office/drawing/2014/main" id="{B76B741B-0B03-4AFF-A6C7-15E994114738}"/>
-              </a:ext>
-            </a:extLst>
-          </p:cNvPr>
-          <p:cNvSpPr txBox="1"/>
-          <p:nvPr/>
-        </p:nvSpPr>
-        <p:spPr>
-          <a:xfrm>
-            <a:off x="6808646" y="1692832"/>
-            <a:ext cx="1407758" cy="338554"/>
-          </a:xfrm>
-          <a:prstGeom prst="rect">
-            <a:avLst/>
-          </a:prstGeom>
-          <a:noFill/>
-        </p:spPr>
-        <p:txBody>
-          <a:bodyPr wrap="none" rtlCol="0">
-            <a:spAutoFit/>
-          </a:bodyPr>
-          <a:lstStyle/>
-          <a:p>
-            <a:r>
-              <a:rPr kumimoji="1" lang="en-US" altLang="ja-JP" sz="1600" b="1" dirty="0"/>
-              <a:t>Server Hello</a:t>
-            </a:r>
-            <a:endParaRPr kumimoji="1" lang="ja-JP" altLang="en-US" sz="1600" b="1" dirty="0"/>
           </a:p>
         </p:txBody>
       </p:sp>
@@ -17845,50 +17809,6 @@
               <a:t>App. Data               </a:t>
             </a:r>
             <a:endParaRPr kumimoji="1" lang="ja-JP" altLang="en-US" sz="1200" dirty="0"/>
-          </a:p>
-        </p:txBody>
-      </p:sp>
-      <p:sp>
-        <p:nvSpPr>
-          <p:cNvPr id="66" name="テキスト ボックス 65">
-            <a:extLst>
-              <a:ext uri="{FF2B5EF4-FFF2-40B4-BE49-F238E27FC236}">
-                <a16:creationId xmlns:a16="http://schemas.microsoft.com/office/drawing/2014/main" id="{9B5B38C6-252B-4063-9FD7-D1C3BF09D49F}"/>
-              </a:ext>
-            </a:extLst>
-          </p:cNvPr>
-          <p:cNvSpPr txBox="1"/>
-          <p:nvPr/>
-        </p:nvSpPr>
-        <p:spPr>
-          <a:xfrm>
-            <a:off x="1674730" y="1821980"/>
-            <a:ext cx="1354858" cy="338554"/>
-          </a:xfrm>
-          <a:prstGeom prst="rect">
-            <a:avLst/>
-          </a:prstGeom>
-          <a:noFill/>
-        </p:spPr>
-        <p:txBody>
-          <a:bodyPr wrap="none" rtlCol="0">
-            <a:spAutoFit/>
-          </a:bodyPr>
-          <a:lstStyle/>
-          <a:p>
-            <a:r>
-              <a:rPr kumimoji="1" lang="en-US" altLang="ja-JP" sz="1600" b="1" dirty="0"/>
-              <a:t>Client</a:t>
-            </a:r>
-            <a:r>
-              <a:rPr kumimoji="1" lang="ja-JP" altLang="en-US" sz="1600" b="1" dirty="0"/>
-              <a:t> </a:t>
-            </a:r>
-            <a:r>
-              <a:rPr kumimoji="1" lang="en-US" altLang="ja-JP" sz="1600" b="1" dirty="0"/>
-              <a:t>Hello</a:t>
-            </a:r>
-            <a:endParaRPr kumimoji="1" lang="ja-JP" altLang="en-US" sz="1600" b="1" dirty="0"/>
           </a:p>
         </p:txBody>
       </p:sp>
@@ -18648,6 +18568,206 @@
           </a:p>
         </p:txBody>
       </p:sp>
+      <p:sp>
+        <p:nvSpPr>
+          <p:cNvPr id="3" name="矢印: 右 2">
+            <a:extLst>
+              <a:ext uri="{FF2B5EF4-FFF2-40B4-BE49-F238E27FC236}">
+                <a16:creationId xmlns:a16="http://schemas.microsoft.com/office/drawing/2014/main" id="{3D7E13A9-02A5-4E5F-B768-FE7733131E36}"/>
+              </a:ext>
+            </a:extLst>
+          </p:cNvPr>
+          <p:cNvSpPr/>
+          <p:nvPr/>
+        </p:nvSpPr>
+        <p:spPr>
+          <a:xfrm>
+            <a:off x="5047943" y="1479093"/>
+            <a:ext cx="1354859" cy="657932"/>
+          </a:xfrm>
+          <a:prstGeom prst="rightArrow">
+            <a:avLst/>
+          </a:prstGeom>
+          <a:solidFill>
+            <a:schemeClr val="accent6">
+              <a:lumMod val="20000"/>
+              <a:lumOff val="80000"/>
+            </a:schemeClr>
+          </a:solidFill>
+          <a:ln>
+            <a:solidFill>
+              <a:schemeClr val="accent6">
+                <a:lumMod val="20000"/>
+                <a:lumOff val="80000"/>
+              </a:schemeClr>
+            </a:solidFill>
+          </a:ln>
+        </p:spPr>
+        <p:style>
+          <a:lnRef idx="2">
+            <a:schemeClr val="accent1">
+              <a:shade val="50000"/>
+            </a:schemeClr>
+          </a:lnRef>
+          <a:fillRef idx="1">
+            <a:schemeClr val="accent1"/>
+          </a:fillRef>
+          <a:effectRef idx="0">
+            <a:schemeClr val="accent1"/>
+          </a:effectRef>
+          <a:fontRef idx="minor">
+            <a:schemeClr val="lt1"/>
+          </a:fontRef>
+        </p:style>
+        <p:txBody>
+          <a:bodyPr rtlCol="0" anchor="ctr"/>
+          <a:lstStyle/>
+          <a:p>
+            <a:pPr algn="ctr"/>
+            <a:endParaRPr kumimoji="1" lang="ja-JP" altLang="en-US"/>
+          </a:p>
+        </p:txBody>
+      </p:sp>
+      <p:sp>
+        <p:nvSpPr>
+          <p:cNvPr id="66" name="テキスト ボックス 65">
+            <a:extLst>
+              <a:ext uri="{FF2B5EF4-FFF2-40B4-BE49-F238E27FC236}">
+                <a16:creationId xmlns:a16="http://schemas.microsoft.com/office/drawing/2014/main" id="{9B5B38C6-252B-4063-9FD7-D1C3BF09D49F}"/>
+              </a:ext>
+            </a:extLst>
+          </p:cNvPr>
+          <p:cNvSpPr txBox="1"/>
+          <p:nvPr/>
+        </p:nvSpPr>
+        <p:spPr>
+          <a:xfrm>
+            <a:off x="4848521" y="1697150"/>
+            <a:ext cx="1354858" cy="338554"/>
+          </a:xfrm>
+          <a:prstGeom prst="rect">
+            <a:avLst/>
+          </a:prstGeom>
+          <a:noFill/>
+        </p:spPr>
+        <p:txBody>
+          <a:bodyPr wrap="none" rtlCol="0">
+            <a:spAutoFit/>
+          </a:bodyPr>
+          <a:lstStyle/>
+          <a:p>
+            <a:r>
+              <a:rPr kumimoji="1" lang="en-US" altLang="ja-JP" sz="1600" b="1" dirty="0"/>
+              <a:t>Client</a:t>
+            </a:r>
+            <a:r>
+              <a:rPr kumimoji="1" lang="ja-JP" altLang="en-US" sz="1600" b="1" dirty="0"/>
+              <a:t> </a:t>
+            </a:r>
+            <a:r>
+              <a:rPr kumimoji="1" lang="en-US" altLang="ja-JP" sz="1600" b="1" dirty="0"/>
+              <a:t>Hello</a:t>
+            </a:r>
+            <a:endParaRPr kumimoji="1" lang="ja-JP" altLang="en-US" sz="1600" b="1" dirty="0"/>
+          </a:p>
+        </p:txBody>
+      </p:sp>
+      <p:sp>
+        <p:nvSpPr>
+          <p:cNvPr id="41" name="矢印: 右 40">
+            <a:extLst>
+              <a:ext uri="{FF2B5EF4-FFF2-40B4-BE49-F238E27FC236}">
+                <a16:creationId xmlns:a16="http://schemas.microsoft.com/office/drawing/2014/main" id="{DF000F73-4CE5-496E-ADBD-0ECE0427409C}"/>
+              </a:ext>
+            </a:extLst>
+          </p:cNvPr>
+          <p:cNvSpPr/>
+          <p:nvPr/>
+        </p:nvSpPr>
+        <p:spPr>
+          <a:xfrm flipH="1">
+            <a:off x="5855633" y="3367530"/>
+            <a:ext cx="1354859" cy="657932"/>
+          </a:xfrm>
+          <a:prstGeom prst="rightArrow">
+            <a:avLst/>
+          </a:prstGeom>
+          <a:solidFill>
+            <a:schemeClr val="accent6">
+              <a:lumMod val="20000"/>
+              <a:lumOff val="80000"/>
+            </a:schemeClr>
+          </a:solidFill>
+          <a:ln>
+            <a:solidFill>
+              <a:schemeClr val="accent6">
+                <a:lumMod val="20000"/>
+                <a:lumOff val="80000"/>
+              </a:schemeClr>
+            </a:solidFill>
+          </a:ln>
+        </p:spPr>
+        <p:style>
+          <a:lnRef idx="2">
+            <a:schemeClr val="accent1">
+              <a:shade val="50000"/>
+            </a:schemeClr>
+          </a:lnRef>
+          <a:fillRef idx="1">
+            <a:schemeClr val="accent1"/>
+          </a:fillRef>
+          <a:effectRef idx="0">
+            <a:schemeClr val="accent1"/>
+          </a:effectRef>
+          <a:fontRef idx="minor">
+            <a:schemeClr val="lt1"/>
+          </a:fontRef>
+        </p:style>
+        <p:txBody>
+          <a:bodyPr rtlCol="0" anchor="ctr"/>
+          <a:lstStyle/>
+          <a:p>
+            <a:pPr algn="ctr"/>
+            <a:endParaRPr kumimoji="1" lang="ja-JP" altLang="en-US"/>
+          </a:p>
+        </p:txBody>
+      </p:sp>
+      <p:sp>
+        <p:nvSpPr>
+          <p:cNvPr id="29" name="テキスト ボックス 28">
+            <a:extLst>
+              <a:ext uri="{FF2B5EF4-FFF2-40B4-BE49-F238E27FC236}">
+                <a16:creationId xmlns:a16="http://schemas.microsoft.com/office/drawing/2014/main" id="{B76B741B-0B03-4AFF-A6C7-15E994114738}"/>
+              </a:ext>
+            </a:extLst>
+          </p:cNvPr>
+          <p:cNvSpPr txBox="1"/>
+          <p:nvPr/>
+        </p:nvSpPr>
+        <p:spPr>
+          <a:xfrm>
+            <a:off x="6095259" y="3525415"/>
+            <a:ext cx="1407758" cy="338554"/>
+          </a:xfrm>
+          <a:prstGeom prst="rect">
+            <a:avLst/>
+          </a:prstGeom>
+          <a:noFill/>
+        </p:spPr>
+        <p:txBody>
+          <a:bodyPr wrap="none" rtlCol="0">
+            <a:spAutoFit/>
+          </a:bodyPr>
+          <a:lstStyle/>
+          <a:p>
+            <a:r>
+              <a:rPr kumimoji="1" lang="en-US" altLang="ja-JP" sz="1600" b="1" dirty="0"/>
+              <a:t>Server Hello</a:t>
+            </a:r>
+            <a:endParaRPr kumimoji="1" lang="ja-JP" altLang="en-US" sz="1600" b="1" dirty="0"/>
+          </a:p>
+        </p:txBody>
+      </p:sp>
     </p:spTree>
     <p:extLst>
       <p:ext uri="{BB962C8B-B14F-4D97-AF65-F5344CB8AC3E}">
@@ -18680,10 +18800,10 @@
       </p:grpSpPr>
       <p:sp>
         <p:nvSpPr>
-          <p:cNvPr id="64" name="四角形: 角を丸くする 63">
-            <a:extLst>
-              <a:ext uri="{FF2B5EF4-FFF2-40B4-BE49-F238E27FC236}">
-                <a16:creationId xmlns:a16="http://schemas.microsoft.com/office/drawing/2014/main" id="{D24A5897-1CEE-4706-B2D7-CC11A23FD392}"/>
+          <p:cNvPr id="8" name="四角形: 角を丸くする 7">
+            <a:extLst>
+              <a:ext uri="{FF2B5EF4-FFF2-40B4-BE49-F238E27FC236}">
+                <a16:creationId xmlns:a16="http://schemas.microsoft.com/office/drawing/2014/main" id="{89F8E7EF-294E-40B2-9D24-0E073A89E67E}"/>
               </a:ext>
             </a:extLst>
           </p:cNvPr>
@@ -18692,8 +18812,161 @@
         </p:nvSpPr>
         <p:spPr>
           <a:xfrm>
-            <a:off x="1736895" y="2086962"/>
-            <a:ext cx="3485157" cy="1865089"/>
+            <a:off x="6859298" y="2068500"/>
+            <a:ext cx="3485157" cy="2188659"/>
+          </a:xfrm>
+          <a:prstGeom prst="roundRect">
+            <a:avLst>
+              <a:gd name="adj" fmla="val 9227"/>
+            </a:avLst>
+          </a:prstGeom>
+          <a:solidFill>
+            <a:schemeClr val="accent6">
+              <a:lumMod val="20000"/>
+              <a:lumOff val="80000"/>
+            </a:schemeClr>
+          </a:solidFill>
+          <a:ln>
+            <a:noFill/>
+          </a:ln>
+        </p:spPr>
+        <p:style>
+          <a:lnRef idx="2">
+            <a:schemeClr val="accent1">
+              <a:shade val="50000"/>
+            </a:schemeClr>
+          </a:lnRef>
+          <a:fillRef idx="1">
+            <a:schemeClr val="accent1"/>
+          </a:fillRef>
+          <a:effectRef idx="0">
+            <a:schemeClr val="accent1"/>
+          </a:effectRef>
+          <a:fontRef idx="minor">
+            <a:schemeClr val="lt1"/>
+          </a:fontRef>
+        </p:style>
+        <p:txBody>
+          <a:bodyPr rtlCol="0" anchor="ctr"/>
+          <a:lstStyle/>
+          <a:p>
+            <a:pPr algn="ctr"/>
+            <a:endParaRPr kumimoji="1" lang="ja-JP" altLang="en-US"/>
+          </a:p>
+        </p:txBody>
+      </p:sp>
+      <p:sp>
+        <p:nvSpPr>
+          <p:cNvPr id="77" name="矢印: 右 76">
+            <a:extLst>
+              <a:ext uri="{FF2B5EF4-FFF2-40B4-BE49-F238E27FC236}">
+                <a16:creationId xmlns:a16="http://schemas.microsoft.com/office/drawing/2014/main" id="{8AE0DF9D-04A4-4E38-9724-75F2330FBF92}"/>
+              </a:ext>
+            </a:extLst>
+          </p:cNvPr>
+          <p:cNvSpPr/>
+          <p:nvPr/>
+        </p:nvSpPr>
+        <p:spPr>
+          <a:xfrm flipH="1">
+            <a:off x="5485620" y="3522737"/>
+            <a:ext cx="1354859" cy="657932"/>
+          </a:xfrm>
+          <a:prstGeom prst="rightArrow">
+            <a:avLst/>
+          </a:prstGeom>
+          <a:solidFill>
+            <a:schemeClr val="accent6">
+              <a:lumMod val="20000"/>
+              <a:lumOff val="80000"/>
+            </a:schemeClr>
+          </a:solidFill>
+          <a:ln>
+            <a:solidFill>
+              <a:schemeClr val="accent6">
+                <a:lumMod val="20000"/>
+                <a:lumOff val="80000"/>
+              </a:schemeClr>
+            </a:solidFill>
+          </a:ln>
+        </p:spPr>
+        <p:style>
+          <a:lnRef idx="2">
+            <a:schemeClr val="accent1">
+              <a:shade val="50000"/>
+            </a:schemeClr>
+          </a:lnRef>
+          <a:fillRef idx="1">
+            <a:schemeClr val="accent1"/>
+          </a:fillRef>
+          <a:effectRef idx="0">
+            <a:schemeClr val="accent1"/>
+          </a:effectRef>
+          <a:fontRef idx="minor">
+            <a:schemeClr val="lt1"/>
+          </a:fontRef>
+        </p:style>
+        <p:txBody>
+          <a:bodyPr rtlCol="0" anchor="ctr"/>
+          <a:lstStyle/>
+          <a:p>
+            <a:pPr algn="ctr"/>
+            <a:endParaRPr kumimoji="1" lang="ja-JP" altLang="en-US"/>
+          </a:p>
+        </p:txBody>
+      </p:sp>
+      <p:sp>
+        <p:nvSpPr>
+          <p:cNvPr id="78" name="テキスト ボックス 77">
+            <a:extLst>
+              <a:ext uri="{FF2B5EF4-FFF2-40B4-BE49-F238E27FC236}">
+                <a16:creationId xmlns:a16="http://schemas.microsoft.com/office/drawing/2014/main" id="{2964E111-32A4-4F4A-B583-FDDC6E52B32A}"/>
+              </a:ext>
+            </a:extLst>
+          </p:cNvPr>
+          <p:cNvSpPr txBox="1"/>
+          <p:nvPr/>
+        </p:nvSpPr>
+        <p:spPr>
+          <a:xfrm>
+            <a:off x="5644357" y="3668501"/>
+            <a:ext cx="1407758" cy="338554"/>
+          </a:xfrm>
+          <a:prstGeom prst="rect">
+            <a:avLst/>
+          </a:prstGeom>
+          <a:noFill/>
+        </p:spPr>
+        <p:txBody>
+          <a:bodyPr wrap="none" rtlCol="0">
+            <a:spAutoFit/>
+          </a:bodyPr>
+          <a:lstStyle/>
+          <a:p>
+            <a:r>
+              <a:rPr kumimoji="1" lang="en-US" altLang="ja-JP" sz="1600" b="1" dirty="0"/>
+              <a:t>Server Hello</a:t>
+            </a:r>
+            <a:endParaRPr kumimoji="1" lang="ja-JP" altLang="en-US" sz="1600" b="1" dirty="0"/>
+          </a:p>
+        </p:txBody>
+      </p:sp>
+      <p:sp>
+        <p:nvSpPr>
+          <p:cNvPr id="64" name="四角形: 角を丸くする 63">
+            <a:extLst>
+              <a:ext uri="{FF2B5EF4-FFF2-40B4-BE49-F238E27FC236}">
+                <a16:creationId xmlns:a16="http://schemas.microsoft.com/office/drawing/2014/main" id="{D24A5897-1CEE-4706-B2D7-CC11A23FD392}"/>
+              </a:ext>
+            </a:extLst>
+          </p:cNvPr>
+          <p:cNvSpPr/>
+          <p:nvPr/>
+        </p:nvSpPr>
+        <p:spPr>
+          <a:xfrm>
+            <a:off x="1736895" y="1397488"/>
+            <a:ext cx="3485157" cy="2554564"/>
           </a:xfrm>
           <a:prstGeom prst="roundRect">
             <a:avLst>
@@ -18943,63 +19216,6 @@
                 <a:lumMod val="75000"/>
               </a:schemeClr>
             </a:solidFill>
-          </a:ln>
-        </p:spPr>
-        <p:style>
-          <a:lnRef idx="2">
-            <a:schemeClr val="accent1">
-              <a:shade val="50000"/>
-            </a:schemeClr>
-          </a:lnRef>
-          <a:fillRef idx="1">
-            <a:schemeClr val="accent1"/>
-          </a:fillRef>
-          <a:effectRef idx="0">
-            <a:schemeClr val="accent1"/>
-          </a:effectRef>
-          <a:fontRef idx="minor">
-            <a:schemeClr val="lt1"/>
-          </a:fontRef>
-        </p:style>
-        <p:txBody>
-          <a:bodyPr rtlCol="0" anchor="ctr"/>
-          <a:lstStyle/>
-          <a:p>
-            <a:pPr algn="ctr"/>
-            <a:endParaRPr kumimoji="1" lang="ja-JP" altLang="en-US"/>
-          </a:p>
-        </p:txBody>
-      </p:sp>
-      <p:sp>
-        <p:nvSpPr>
-          <p:cNvPr id="8" name="四角形: 角を丸くする 7">
-            <a:extLst>
-              <a:ext uri="{FF2B5EF4-FFF2-40B4-BE49-F238E27FC236}">
-                <a16:creationId xmlns:a16="http://schemas.microsoft.com/office/drawing/2014/main" id="{89F8E7EF-294E-40B2-9D24-0E073A89E67E}"/>
-              </a:ext>
-            </a:extLst>
-          </p:cNvPr>
-          <p:cNvSpPr/>
-          <p:nvPr/>
-        </p:nvSpPr>
-        <p:spPr>
-          <a:xfrm>
-            <a:off x="6859298" y="2068500"/>
-            <a:ext cx="3485157" cy="1889143"/>
-          </a:xfrm>
-          <a:prstGeom prst="roundRect">
-            <a:avLst>
-              <a:gd name="adj" fmla="val 9227"/>
-            </a:avLst>
-          </a:prstGeom>
-          <a:solidFill>
-            <a:schemeClr val="accent6">
-              <a:lumMod val="20000"/>
-              <a:lumOff val="80000"/>
-            </a:schemeClr>
-          </a:solidFill>
-          <a:ln>
-            <a:noFill/>
           </a:ln>
         </p:spPr>
         <p:style>
@@ -19631,70 +19847,6 @@
       </p:sp>
       <p:sp>
         <p:nvSpPr>
-          <p:cNvPr id="23" name="矢印: 折線 22">
-            <a:extLst>
-              <a:ext uri="{FF2B5EF4-FFF2-40B4-BE49-F238E27FC236}">
-                <a16:creationId xmlns:a16="http://schemas.microsoft.com/office/drawing/2014/main" id="{8C165867-5CBB-4442-A88B-0784BA3ADE1C}"/>
-              </a:ext>
-            </a:extLst>
-          </p:cNvPr>
-          <p:cNvSpPr/>
-          <p:nvPr/>
-        </p:nvSpPr>
-        <p:spPr>
-          <a:xfrm flipH="1" flipV="1">
-            <a:off x="5892961" y="3885297"/>
-            <a:ext cx="2612723" cy="660769"/>
-          </a:xfrm>
-          <a:prstGeom prst="bentArrow">
-            <a:avLst>
-              <a:gd name="adj1" fmla="val 18871"/>
-              <a:gd name="adj2" fmla="val 35175"/>
-              <a:gd name="adj3" fmla="val 25000"/>
-              <a:gd name="adj4" fmla="val 43750"/>
-            </a:avLst>
-          </a:prstGeom>
-          <a:solidFill>
-            <a:schemeClr val="accent3">
-              <a:lumMod val="40000"/>
-              <a:lumOff val="60000"/>
-            </a:schemeClr>
-          </a:solidFill>
-          <a:ln>
-            <a:noFill/>
-          </a:ln>
-        </p:spPr>
-        <p:style>
-          <a:lnRef idx="2">
-            <a:schemeClr val="accent1">
-              <a:shade val="50000"/>
-            </a:schemeClr>
-          </a:lnRef>
-          <a:fillRef idx="1">
-            <a:schemeClr val="accent1"/>
-          </a:fillRef>
-          <a:effectRef idx="0">
-            <a:schemeClr val="accent1"/>
-          </a:effectRef>
-          <a:fontRef idx="minor">
-            <a:schemeClr val="lt1"/>
-          </a:fontRef>
-        </p:style>
-        <p:txBody>
-          <a:bodyPr rtlCol="0" anchor="ctr"/>
-          <a:lstStyle/>
-          <a:p>
-            <a:pPr algn="ctr"/>
-            <a:endParaRPr kumimoji="1" lang="ja-JP" altLang="en-US">
-              <a:solidFill>
-                <a:schemeClr val="tx1"/>
-              </a:solidFill>
-            </a:endParaRPr>
-          </a:p>
-        </p:txBody>
-      </p:sp>
-      <p:sp>
-        <p:nvSpPr>
           <p:cNvPr id="24" name="フリーフォーム: 図形 23">
             <a:extLst>
               <a:ext uri="{FF2B5EF4-FFF2-40B4-BE49-F238E27FC236}">
@@ -20105,42 +20257,6 @@
           </a:p>
         </p:txBody>
       </p:sp>
-      <p:sp>
-        <p:nvSpPr>
-          <p:cNvPr id="29" name="テキスト ボックス 28">
-            <a:extLst>
-              <a:ext uri="{FF2B5EF4-FFF2-40B4-BE49-F238E27FC236}">
-                <a16:creationId xmlns:a16="http://schemas.microsoft.com/office/drawing/2014/main" id="{B76B741B-0B03-4AFF-A6C7-15E994114738}"/>
-              </a:ext>
-            </a:extLst>
-          </p:cNvPr>
-          <p:cNvSpPr txBox="1"/>
-          <p:nvPr/>
-        </p:nvSpPr>
-        <p:spPr>
-          <a:xfrm>
-            <a:off x="6808646" y="1692832"/>
-            <a:ext cx="1407758" cy="338554"/>
-          </a:xfrm>
-          <a:prstGeom prst="rect">
-            <a:avLst/>
-          </a:prstGeom>
-          <a:noFill/>
-        </p:spPr>
-        <p:txBody>
-          <a:bodyPr wrap="none" rtlCol="0">
-            <a:spAutoFit/>
-          </a:bodyPr>
-          <a:lstStyle/>
-          <a:p>
-            <a:r>
-              <a:rPr kumimoji="1" lang="en-US" altLang="ja-JP" sz="1600" b="1" dirty="0"/>
-              <a:t>Server Hello</a:t>
-            </a:r>
-            <a:endParaRPr kumimoji="1" lang="ja-JP" altLang="en-US" sz="1600" b="1" dirty="0"/>
-          </a:p>
-        </p:txBody>
-      </p:sp>
       <p:cxnSp>
         <p:nvCxnSpPr>
           <p:cNvPr id="30" name="直線矢印コネクタ 29">
@@ -22028,50 +22144,6 @@
               <a:t>App. Data               </a:t>
             </a:r>
             <a:endParaRPr kumimoji="1" lang="ja-JP" altLang="en-US" sz="1200" dirty="0"/>
-          </a:p>
-        </p:txBody>
-      </p:sp>
-      <p:sp>
-        <p:nvSpPr>
-          <p:cNvPr id="66" name="テキスト ボックス 65">
-            <a:extLst>
-              <a:ext uri="{FF2B5EF4-FFF2-40B4-BE49-F238E27FC236}">
-                <a16:creationId xmlns:a16="http://schemas.microsoft.com/office/drawing/2014/main" id="{9B5B38C6-252B-4063-9FD7-D1C3BF09D49F}"/>
-              </a:ext>
-            </a:extLst>
-          </p:cNvPr>
-          <p:cNvSpPr txBox="1"/>
-          <p:nvPr/>
-        </p:nvSpPr>
-        <p:spPr>
-          <a:xfrm>
-            <a:off x="1674730" y="1821980"/>
-            <a:ext cx="1354858" cy="338554"/>
-          </a:xfrm>
-          <a:prstGeom prst="rect">
-            <a:avLst/>
-          </a:prstGeom>
-          <a:noFill/>
-        </p:spPr>
-        <p:txBody>
-          <a:bodyPr wrap="none" rtlCol="0">
-            <a:spAutoFit/>
-          </a:bodyPr>
-          <a:lstStyle/>
-          <a:p>
-            <a:r>
-              <a:rPr kumimoji="1" lang="en-US" altLang="ja-JP" sz="1600" b="1" dirty="0"/>
-              <a:t>Client</a:t>
-            </a:r>
-            <a:r>
-              <a:rPr kumimoji="1" lang="ja-JP" altLang="en-US" sz="1600" b="1" dirty="0"/>
-              <a:t> </a:t>
-            </a:r>
-            <a:r>
-              <a:rPr kumimoji="1" lang="en-US" altLang="ja-JP" sz="1600" b="1" dirty="0"/>
-              <a:t>Hello</a:t>
-            </a:r>
-            <a:endParaRPr kumimoji="1" lang="ja-JP" altLang="en-US" sz="1600" b="1" dirty="0"/>
           </a:p>
         </p:txBody>
       </p:sp>
@@ -22526,6 +22598,110 @@
           </a:p>
         </p:txBody>
       </p:sp>
+      <p:sp>
+        <p:nvSpPr>
+          <p:cNvPr id="75" name="矢印: 右 74">
+            <a:extLst>
+              <a:ext uri="{FF2B5EF4-FFF2-40B4-BE49-F238E27FC236}">
+                <a16:creationId xmlns:a16="http://schemas.microsoft.com/office/drawing/2014/main" id="{2E86668C-9BF9-4186-A8E9-0F429E8A5699}"/>
+              </a:ext>
+            </a:extLst>
+          </p:cNvPr>
+          <p:cNvSpPr/>
+          <p:nvPr/>
+        </p:nvSpPr>
+        <p:spPr>
+          <a:xfrm>
+            <a:off x="5047943" y="1479093"/>
+            <a:ext cx="1354859" cy="657932"/>
+          </a:xfrm>
+          <a:prstGeom prst="rightArrow">
+            <a:avLst/>
+          </a:prstGeom>
+          <a:solidFill>
+            <a:schemeClr val="accent6">
+              <a:lumMod val="20000"/>
+              <a:lumOff val="80000"/>
+            </a:schemeClr>
+          </a:solidFill>
+          <a:ln>
+            <a:solidFill>
+              <a:schemeClr val="accent6">
+                <a:lumMod val="20000"/>
+                <a:lumOff val="80000"/>
+              </a:schemeClr>
+            </a:solidFill>
+          </a:ln>
+        </p:spPr>
+        <p:style>
+          <a:lnRef idx="2">
+            <a:schemeClr val="accent1">
+              <a:shade val="50000"/>
+            </a:schemeClr>
+          </a:lnRef>
+          <a:fillRef idx="1">
+            <a:schemeClr val="accent1"/>
+          </a:fillRef>
+          <a:effectRef idx="0">
+            <a:schemeClr val="accent1"/>
+          </a:effectRef>
+          <a:fontRef idx="minor">
+            <a:schemeClr val="lt1"/>
+          </a:fontRef>
+        </p:style>
+        <p:txBody>
+          <a:bodyPr rtlCol="0" anchor="ctr"/>
+          <a:lstStyle/>
+          <a:p>
+            <a:pPr algn="ctr"/>
+            <a:endParaRPr kumimoji="1" lang="ja-JP" altLang="en-US"/>
+          </a:p>
+        </p:txBody>
+      </p:sp>
+      <p:sp>
+        <p:nvSpPr>
+          <p:cNvPr id="76" name="テキスト ボックス 75">
+            <a:extLst>
+              <a:ext uri="{FF2B5EF4-FFF2-40B4-BE49-F238E27FC236}">
+                <a16:creationId xmlns:a16="http://schemas.microsoft.com/office/drawing/2014/main" id="{DBE57010-36D5-4288-B88D-14AC971A4E90}"/>
+              </a:ext>
+            </a:extLst>
+          </p:cNvPr>
+          <p:cNvSpPr txBox="1"/>
+          <p:nvPr/>
+        </p:nvSpPr>
+        <p:spPr>
+          <a:xfrm>
+            <a:off x="4936885" y="1646151"/>
+            <a:ext cx="1354858" cy="338554"/>
+          </a:xfrm>
+          <a:prstGeom prst="rect">
+            <a:avLst/>
+          </a:prstGeom>
+          <a:noFill/>
+        </p:spPr>
+        <p:txBody>
+          <a:bodyPr wrap="none" rtlCol="0">
+            <a:spAutoFit/>
+          </a:bodyPr>
+          <a:lstStyle/>
+          <a:p>
+            <a:r>
+              <a:rPr kumimoji="1" lang="en-US" altLang="ja-JP" sz="1600" b="1" dirty="0"/>
+              <a:t>Client</a:t>
+            </a:r>
+            <a:r>
+              <a:rPr kumimoji="1" lang="ja-JP" altLang="en-US" sz="1600" b="1" dirty="0"/>
+              <a:t> </a:t>
+            </a:r>
+            <a:r>
+              <a:rPr kumimoji="1" lang="en-US" altLang="ja-JP" sz="1600" b="1" dirty="0"/>
+              <a:t>Hello</a:t>
+            </a:r>
+            <a:endParaRPr kumimoji="1" lang="ja-JP" altLang="en-US" sz="1600" b="1" dirty="0"/>
+          </a:p>
+        </p:txBody>
+      </p:sp>
     </p:spTree>
     <p:extLst>
       <p:ext uri="{BB962C8B-B14F-4D97-AF65-F5344CB8AC3E}">
@@ -22990,7 +23166,7 @@
         <p:fade/>
       </p:transition>
     </mc:Choice>
-    <mc:Fallback xmlns="" xmlns:mv="urn:schemas-microsoft-com:mac:vml" xmlns:c="http://schemas.openxmlformats.org/drawingml/2006/chart" xmlns:dgm="http://schemas.openxmlformats.org/drawingml/2006/diagram" xmlns:o="urn:schemas-microsoft-com:office:office" xmlns:v="urn:schemas-microsoft-com:vml" xmlns:pvml="urn:schemas-microsoft-com:office:powerpoint" xmlns:com="http://schemas.openxmlformats.org/drawingml/2006/compatibility" xmlns:p15="http://schemas.microsoft.com/office/powerpoint/2012/main" xmlns:ahyp="http://schemas.microsoft.com/office/drawing/2018/hyperlinkcolor">
+    <mc:Fallback xmlns:ahyp="http://schemas.microsoft.com/office/drawing/2018/hyperlinkcolor" xmlns:p15="http://schemas.microsoft.com/office/powerpoint/2012/main" xmlns:com="http://schemas.openxmlformats.org/drawingml/2006/compatibility" xmlns:pvml="urn:schemas-microsoft-com:office:powerpoint" xmlns:v="urn:schemas-microsoft-com:vml" xmlns:o="urn:schemas-microsoft-com:office:office" xmlns:dgm="http://schemas.openxmlformats.org/drawingml/2006/diagram" xmlns:c="http://schemas.openxmlformats.org/drawingml/2006/chart" xmlns:mv="urn:schemas-microsoft-com:mac:vml" xmlns="">
       <p:transition spd="slow">
         <p:fade/>
       </p:transition>
@@ -23030,8 +23206,8 @@
         </p:nvSpPr>
         <p:spPr>
           <a:xfrm>
-            <a:off x="6859298" y="2328993"/>
-            <a:ext cx="3485157" cy="1628650"/>
+            <a:off x="6859298" y="3408992"/>
+            <a:ext cx="3751109" cy="1628650"/>
           </a:xfrm>
           <a:prstGeom prst="roundRect">
             <a:avLst>
@@ -23518,7 +23694,7 @@
         </p:nvGrpSpPr>
         <p:grpSpPr>
           <a:xfrm>
-            <a:off x="7012287" y="2574539"/>
+            <a:off x="7012287" y="3654538"/>
             <a:ext cx="3901787" cy="1218102"/>
             <a:chOff x="6726889" y="3078364"/>
             <a:chExt cx="6097120" cy="1218102"/>
@@ -23643,8 +23819,8 @@
           </p:nvSpPr>
           <p:spPr>
             <a:xfrm>
-              <a:off x="6726890" y="3363807"/>
-              <a:ext cx="4985497" cy="245879"/>
+              <a:off x="6726889" y="3363807"/>
+              <a:ext cx="5207004" cy="241895"/>
             </a:xfrm>
             <a:prstGeom prst="rect">
               <a:avLst/>
@@ -23691,7 +23867,7 @@
           <p:spPr>
             <a:xfrm>
               <a:off x="6741458" y="3821114"/>
-              <a:ext cx="4985498" cy="475352"/>
+              <a:ext cx="5192436" cy="475352"/>
             </a:xfrm>
             <a:prstGeom prst="rect">
               <a:avLst/>
@@ -23738,8 +23914,8 @@
         </p:nvSpPr>
         <p:spPr>
           <a:xfrm>
-            <a:off x="7012287" y="2544152"/>
-            <a:ext cx="3055429" cy="261610"/>
+            <a:off x="7012287" y="3624151"/>
+            <a:ext cx="3332167" cy="261610"/>
           </a:xfrm>
           <a:prstGeom prst="rect">
             <a:avLst/>
@@ -23815,70 +23991,6 @@
           <a:p>
             <a:pPr algn="ctr"/>
             <a:endParaRPr kumimoji="1" lang="ja-JP" altLang="en-US" sz="1400"/>
-          </a:p>
-        </p:txBody>
-      </p:sp>
-      <p:sp>
-        <p:nvSpPr>
-          <p:cNvPr id="36" name="矢印: 折線 35">
-            <a:extLst>
-              <a:ext uri="{FF2B5EF4-FFF2-40B4-BE49-F238E27FC236}">
-                <a16:creationId xmlns:a16="http://schemas.microsoft.com/office/drawing/2014/main" id="{041A5EE0-ABFA-4199-A3E9-7A0DC16C9831}"/>
-              </a:ext>
-            </a:extLst>
-          </p:cNvPr>
-          <p:cNvSpPr/>
-          <p:nvPr/>
-        </p:nvSpPr>
-        <p:spPr>
-          <a:xfrm rot="5400000">
-            <a:off x="6788877" y="687306"/>
-            <a:ext cx="877667" cy="2534412"/>
-          </a:xfrm>
-          <a:prstGeom prst="bentArrow">
-            <a:avLst>
-              <a:gd name="adj1" fmla="val 18871"/>
-              <a:gd name="adj2" fmla="val 25000"/>
-              <a:gd name="adj3" fmla="val 25000"/>
-              <a:gd name="adj4" fmla="val 43750"/>
-            </a:avLst>
-          </a:prstGeom>
-          <a:solidFill>
-            <a:schemeClr val="accent3">
-              <a:lumMod val="40000"/>
-              <a:lumOff val="60000"/>
-            </a:schemeClr>
-          </a:solidFill>
-          <a:ln>
-            <a:noFill/>
-          </a:ln>
-        </p:spPr>
-        <p:style>
-          <a:lnRef idx="2">
-            <a:schemeClr val="accent1">
-              <a:shade val="50000"/>
-            </a:schemeClr>
-          </a:lnRef>
-          <a:fillRef idx="1">
-            <a:schemeClr val="accent1"/>
-          </a:fillRef>
-          <a:effectRef idx="0">
-            <a:schemeClr val="accent1"/>
-          </a:effectRef>
-          <a:fontRef idx="minor">
-            <a:schemeClr val="lt1"/>
-          </a:fontRef>
-        </p:style>
-        <p:txBody>
-          <a:bodyPr rtlCol="0" anchor="ctr"/>
-          <a:lstStyle/>
-          <a:p>
-            <a:pPr algn="ctr"/>
-            <a:endParaRPr kumimoji="1" lang="ja-JP" altLang="en-US">
-              <a:solidFill>
-                <a:schemeClr val="tx1"/>
-              </a:solidFill>
-            </a:endParaRPr>
           </a:p>
         </p:txBody>
       </p:sp>
@@ -24005,7 +24117,7 @@
         </p:nvSpPr>
         <p:spPr>
           <a:xfrm>
-            <a:off x="7295764" y="3468987"/>
+            <a:off x="7295764" y="4548986"/>
             <a:ext cx="2526440" cy="223423"/>
           </a:xfrm>
           <a:prstGeom prst="roundRect">
@@ -24062,7 +24174,7 @@
         </p:nvSpPr>
         <p:spPr>
           <a:xfrm>
-            <a:off x="7295764" y="3468987"/>
+            <a:off x="7295764" y="4548986"/>
             <a:ext cx="2492990" cy="276999"/>
           </a:xfrm>
           <a:prstGeom prst="rect">
@@ -24118,10 +24230,10 @@
       </p:sp>
       <p:sp>
         <p:nvSpPr>
-          <p:cNvPr id="80" name="テキスト ボックス 79">
-            <a:extLst>
-              <a:ext uri="{FF2B5EF4-FFF2-40B4-BE49-F238E27FC236}">
-                <a16:creationId xmlns:a16="http://schemas.microsoft.com/office/drawing/2014/main" id="{9F153623-3CE6-47FC-98DE-6C9FFD75D017}"/>
+          <p:cNvPr id="82" name="テキスト ボックス 81">
+            <a:extLst>
+              <a:ext uri="{FF2B5EF4-FFF2-40B4-BE49-F238E27FC236}">
+                <a16:creationId xmlns:a16="http://schemas.microsoft.com/office/drawing/2014/main" id="{F2700012-2DF6-4CA8-9667-911F447D24F6}"/>
               </a:ext>
             </a:extLst>
           </p:cNvPr>
@@ -24130,8 +24242,8 @@
         </p:nvSpPr>
         <p:spPr>
           <a:xfrm>
-            <a:off x="1581593" y="-39676"/>
-            <a:ext cx="1354858" cy="338554"/>
+            <a:off x="6767592" y="100106"/>
+            <a:ext cx="4698722" cy="1077218"/>
           </a:xfrm>
           <a:prstGeom prst="rect">
             <a:avLst/>
@@ -24144,78 +24256,6 @@
           </a:bodyPr>
           <a:lstStyle/>
           <a:p>
-            <a:r>
-              <a:rPr kumimoji="1" lang="en-US" altLang="ja-JP" sz="1600" b="1"/>
-              <a:t>Client Hello</a:t>
-            </a:r>
-            <a:endParaRPr kumimoji="1" lang="ja-JP" altLang="en-US" sz="1600" b="1"/>
-          </a:p>
-        </p:txBody>
-      </p:sp>
-      <p:sp>
-        <p:nvSpPr>
-          <p:cNvPr id="81" name="テキスト ボックス 80">
-            <a:extLst>
-              <a:ext uri="{FF2B5EF4-FFF2-40B4-BE49-F238E27FC236}">
-                <a16:creationId xmlns:a16="http://schemas.microsoft.com/office/drawing/2014/main" id="{46384B96-7FE9-47DE-A63D-0E576345A34A}"/>
-              </a:ext>
-            </a:extLst>
-          </p:cNvPr>
-          <p:cNvSpPr txBox="1"/>
-          <p:nvPr/>
-        </p:nvSpPr>
-        <p:spPr>
-          <a:xfrm>
-            <a:off x="6659371" y="2008291"/>
-            <a:ext cx="1407758" cy="338554"/>
-          </a:xfrm>
-          <a:prstGeom prst="rect">
-            <a:avLst/>
-          </a:prstGeom>
-          <a:noFill/>
-        </p:spPr>
-        <p:txBody>
-          <a:bodyPr wrap="none" rtlCol="0">
-            <a:spAutoFit/>
-          </a:bodyPr>
-          <a:lstStyle/>
-          <a:p>
-            <a:r>
-              <a:rPr kumimoji="1" lang="en-US" altLang="ja-JP" sz="1600" b="1" dirty="0"/>
-              <a:t>Server Hello</a:t>
-            </a:r>
-            <a:endParaRPr kumimoji="1" lang="ja-JP" altLang="en-US" sz="1600" b="1" dirty="0"/>
-          </a:p>
-        </p:txBody>
-      </p:sp>
-      <p:sp>
-        <p:nvSpPr>
-          <p:cNvPr id="82" name="テキスト ボックス 81">
-            <a:extLst>
-              <a:ext uri="{FF2B5EF4-FFF2-40B4-BE49-F238E27FC236}">
-                <a16:creationId xmlns:a16="http://schemas.microsoft.com/office/drawing/2014/main" id="{F2700012-2DF6-4CA8-9667-911F447D24F6}"/>
-              </a:ext>
-            </a:extLst>
-          </p:cNvPr>
-          <p:cNvSpPr txBox="1"/>
-          <p:nvPr/>
-        </p:nvSpPr>
-        <p:spPr>
-          <a:xfrm>
-            <a:off x="6767592" y="100106"/>
-            <a:ext cx="4698722" cy="1077218"/>
-          </a:xfrm>
-          <a:prstGeom prst="rect">
-            <a:avLst/>
-          </a:prstGeom>
-          <a:noFill/>
-        </p:spPr>
-        <p:txBody>
-          <a:bodyPr wrap="none" rtlCol="0">
-            <a:spAutoFit/>
-          </a:bodyPr>
-          <a:lstStyle/>
-          <a:p>
             <a:pPr algn="ctr"/>
             <a:r>
               <a:rPr lang="ja-JP" altLang="en-US" sz="3200" b="1" dirty="0"/>
@@ -24246,7 +24286,7 @@
         </p:nvSpPr>
         <p:spPr>
           <a:xfrm>
-            <a:off x="8329912" y="3468987"/>
+            <a:off x="8329912" y="4548986"/>
             <a:ext cx="1426562" cy="233663"/>
           </a:xfrm>
           <a:prstGeom prst="roundRect">
@@ -24358,7 +24398,7 @@
         </p:nvSpPr>
         <p:spPr>
           <a:xfrm>
-            <a:off x="7348990" y="3475394"/>
+            <a:off x="7348990" y="4555393"/>
             <a:ext cx="816405" cy="201711"/>
           </a:xfrm>
           <a:prstGeom prst="roundRect">
@@ -24458,10 +24498,10 @@
       </p:sp>
       <p:sp>
         <p:nvSpPr>
-          <p:cNvPr id="76" name="矢印: 折線 75">
-            <a:extLst>
-              <a:ext uri="{FF2B5EF4-FFF2-40B4-BE49-F238E27FC236}">
-                <a16:creationId xmlns:a16="http://schemas.microsoft.com/office/drawing/2014/main" id="{6CA14C36-ED0B-4D35-AD03-45B9D8EB6A25}"/>
+          <p:cNvPr id="83" name="四角形: 角を丸くする 82">
+            <a:extLst>
+              <a:ext uri="{FF2B5EF4-FFF2-40B4-BE49-F238E27FC236}">
+                <a16:creationId xmlns:a16="http://schemas.microsoft.com/office/drawing/2014/main" id="{D358D3A8-36D8-4A2A-9A07-320B26A749F8}"/>
               </a:ext>
             </a:extLst>
           </p:cNvPr>
@@ -24469,72 +24509,8 @@
           <p:nvPr/>
         </p:nvSpPr>
         <p:spPr>
-          <a:xfrm flipH="1" flipV="1">
-            <a:off x="5892961" y="3885297"/>
-            <a:ext cx="2612723" cy="660769"/>
-          </a:xfrm>
-          <a:prstGeom prst="bentArrow">
-            <a:avLst>
-              <a:gd name="adj1" fmla="val 18871"/>
-              <a:gd name="adj2" fmla="val 35175"/>
-              <a:gd name="adj3" fmla="val 25000"/>
-              <a:gd name="adj4" fmla="val 43750"/>
-            </a:avLst>
-          </a:prstGeom>
-          <a:solidFill>
-            <a:schemeClr val="accent3">
-              <a:lumMod val="40000"/>
-              <a:lumOff val="60000"/>
-            </a:schemeClr>
-          </a:solidFill>
-          <a:ln>
-            <a:noFill/>
-          </a:ln>
-        </p:spPr>
-        <p:style>
-          <a:lnRef idx="2">
-            <a:schemeClr val="accent1">
-              <a:shade val="50000"/>
-            </a:schemeClr>
-          </a:lnRef>
-          <a:fillRef idx="1">
-            <a:schemeClr val="accent1"/>
-          </a:fillRef>
-          <a:effectRef idx="0">
-            <a:schemeClr val="accent1"/>
-          </a:effectRef>
-          <a:fontRef idx="minor">
-            <a:schemeClr val="lt1"/>
-          </a:fontRef>
-        </p:style>
-        <p:txBody>
-          <a:bodyPr rtlCol="0" anchor="ctr"/>
-          <a:lstStyle/>
-          <a:p>
-            <a:pPr algn="ctr"/>
-            <a:endParaRPr kumimoji="1" lang="ja-JP" altLang="en-US">
-              <a:solidFill>
-                <a:schemeClr val="tx1"/>
-              </a:solidFill>
-            </a:endParaRPr>
-          </a:p>
-        </p:txBody>
-      </p:sp>
-      <p:sp>
-        <p:nvSpPr>
-          <p:cNvPr id="83" name="四角形: 角を丸くする 82">
-            <a:extLst>
-              <a:ext uri="{FF2B5EF4-FFF2-40B4-BE49-F238E27FC236}">
-                <a16:creationId xmlns:a16="http://schemas.microsoft.com/office/drawing/2014/main" id="{D358D3A8-36D8-4A2A-9A07-320B26A749F8}"/>
-              </a:ext>
-            </a:extLst>
-          </p:cNvPr>
-          <p:cNvSpPr/>
-          <p:nvPr/>
-        </p:nvSpPr>
-        <p:spPr>
-          <a:xfrm>
-            <a:off x="6924623" y="5021711"/>
+          <a:xfrm>
+            <a:off x="6924623" y="5751175"/>
             <a:ext cx="3485157" cy="458743"/>
           </a:xfrm>
           <a:prstGeom prst="roundRect">
@@ -24591,7 +24567,7 @@
         </p:nvCxnSpPr>
         <p:spPr>
           <a:xfrm>
-            <a:off x="1460938" y="4648193"/>
+            <a:off x="1460938" y="5377657"/>
             <a:ext cx="8883517" cy="0"/>
           </a:xfrm>
           <a:prstGeom prst="line">
@@ -24630,7 +24606,7 @@
         </p:nvSpPr>
         <p:spPr>
           <a:xfrm rot="10800000">
-            <a:off x="1631977" y="5094583"/>
+            <a:off x="1631977" y="5824047"/>
             <a:ext cx="5277705" cy="306400"/>
           </a:xfrm>
           <a:prstGeom prst="rightArrow">
@@ -24684,7 +24660,7 @@
         </p:nvSpPr>
         <p:spPr>
           <a:xfrm>
-            <a:off x="7647292" y="5094583"/>
+            <a:off x="7647292" y="5824047"/>
             <a:ext cx="2159566" cy="338554"/>
           </a:xfrm>
           <a:prstGeom prst="rect">
@@ -24728,7 +24704,7 @@
         </p:nvSpPr>
         <p:spPr>
           <a:xfrm>
-            <a:off x="133774" y="4938634"/>
+            <a:off x="133774" y="5668098"/>
             <a:ext cx="1253785" cy="584775"/>
           </a:xfrm>
           <a:prstGeom prst="rect">
@@ -24776,7 +24752,7 @@
         </p:nvSpPr>
         <p:spPr>
           <a:xfrm>
-            <a:off x="214559" y="4946091"/>
+            <a:off x="214559" y="5675555"/>
             <a:ext cx="1158059" cy="577311"/>
           </a:xfrm>
           <a:prstGeom prst="roundRect">
@@ -24832,7 +24808,7 @@
         </p:nvSpPr>
         <p:spPr>
           <a:xfrm>
-            <a:off x="4003373" y="4742512"/>
+            <a:off x="4003373" y="5471976"/>
             <a:ext cx="2031325" cy="338554"/>
           </a:xfrm>
           <a:prstGeom prst="rect">
@@ -24849,6 +24825,206 @@
             <a:r>
               <a:rPr lang="ja-JP" altLang="en-US" sz="1600" b="1" dirty="0"/>
               <a:t>安全な通信チャネル</a:t>
+            </a:r>
+            <a:endParaRPr kumimoji="1" lang="ja-JP" altLang="en-US" sz="1600" b="1" dirty="0"/>
+          </a:p>
+        </p:txBody>
+      </p:sp>
+      <p:sp>
+        <p:nvSpPr>
+          <p:cNvPr id="41" name="矢印: 右 40">
+            <a:extLst>
+              <a:ext uri="{FF2B5EF4-FFF2-40B4-BE49-F238E27FC236}">
+                <a16:creationId xmlns:a16="http://schemas.microsoft.com/office/drawing/2014/main" id="{1B738BC5-CB6F-4100-A426-6856DE95BC1B}"/>
+              </a:ext>
+            </a:extLst>
+          </p:cNvPr>
+          <p:cNvSpPr/>
+          <p:nvPr/>
+        </p:nvSpPr>
+        <p:spPr>
+          <a:xfrm flipH="1">
+            <a:off x="5431545" y="4247032"/>
+            <a:ext cx="1478136" cy="744417"/>
+          </a:xfrm>
+          <a:prstGeom prst="rightArrow">
+            <a:avLst/>
+          </a:prstGeom>
+          <a:solidFill>
+            <a:schemeClr val="accent6">
+              <a:lumMod val="20000"/>
+              <a:lumOff val="80000"/>
+            </a:schemeClr>
+          </a:solidFill>
+          <a:ln>
+            <a:solidFill>
+              <a:schemeClr val="accent6">
+                <a:lumMod val="20000"/>
+                <a:lumOff val="80000"/>
+              </a:schemeClr>
+            </a:solidFill>
+          </a:ln>
+        </p:spPr>
+        <p:style>
+          <a:lnRef idx="2">
+            <a:schemeClr val="accent1">
+              <a:shade val="50000"/>
+            </a:schemeClr>
+          </a:lnRef>
+          <a:fillRef idx="1">
+            <a:schemeClr val="accent1"/>
+          </a:fillRef>
+          <a:effectRef idx="0">
+            <a:schemeClr val="accent1"/>
+          </a:effectRef>
+          <a:fontRef idx="minor">
+            <a:schemeClr val="lt1"/>
+          </a:fontRef>
+        </p:style>
+        <p:txBody>
+          <a:bodyPr rtlCol="0" anchor="ctr"/>
+          <a:lstStyle/>
+          <a:p>
+            <a:pPr algn="ctr"/>
+            <a:endParaRPr kumimoji="1" lang="ja-JP" altLang="en-US"/>
+          </a:p>
+        </p:txBody>
+      </p:sp>
+      <p:sp>
+        <p:nvSpPr>
+          <p:cNvPr id="42" name="テキスト ボックス 41">
+            <a:extLst>
+              <a:ext uri="{FF2B5EF4-FFF2-40B4-BE49-F238E27FC236}">
+                <a16:creationId xmlns:a16="http://schemas.microsoft.com/office/drawing/2014/main" id="{4CE3A618-CD36-4FD7-A232-8358706ECE01}"/>
+              </a:ext>
+            </a:extLst>
+          </p:cNvPr>
+          <p:cNvSpPr txBox="1"/>
+          <p:nvPr/>
+        </p:nvSpPr>
+        <p:spPr>
+          <a:xfrm>
+            <a:off x="5518989" y="4472573"/>
+            <a:ext cx="1407758" cy="338554"/>
+          </a:xfrm>
+          <a:prstGeom prst="rect">
+            <a:avLst/>
+          </a:prstGeom>
+          <a:noFill/>
+        </p:spPr>
+        <p:txBody>
+          <a:bodyPr wrap="none" rtlCol="0">
+            <a:spAutoFit/>
+          </a:bodyPr>
+          <a:lstStyle/>
+          <a:p>
+            <a:r>
+              <a:rPr kumimoji="1" lang="en-US" altLang="ja-JP" sz="1600" b="1" dirty="0"/>
+              <a:t>Server Hello</a:t>
+            </a:r>
+            <a:endParaRPr kumimoji="1" lang="ja-JP" altLang="en-US" sz="1600" b="1" dirty="0"/>
+          </a:p>
+        </p:txBody>
+      </p:sp>
+      <p:sp>
+        <p:nvSpPr>
+          <p:cNvPr id="43" name="矢印: 右 42">
+            <a:extLst>
+              <a:ext uri="{FF2B5EF4-FFF2-40B4-BE49-F238E27FC236}">
+                <a16:creationId xmlns:a16="http://schemas.microsoft.com/office/drawing/2014/main" id="{39C587FA-FDE6-4EE4-9707-2FED8AD900AD}"/>
+              </a:ext>
+            </a:extLst>
+          </p:cNvPr>
+          <p:cNvSpPr/>
+          <p:nvPr/>
+        </p:nvSpPr>
+        <p:spPr>
+          <a:xfrm>
+            <a:off x="5890382" y="1180750"/>
+            <a:ext cx="1354859" cy="762704"/>
+          </a:xfrm>
+          <a:prstGeom prst="rightArrow">
+            <a:avLst/>
+          </a:prstGeom>
+          <a:solidFill>
+            <a:schemeClr val="accent6">
+              <a:lumMod val="20000"/>
+              <a:lumOff val="80000"/>
+            </a:schemeClr>
+          </a:solidFill>
+          <a:ln>
+            <a:solidFill>
+              <a:schemeClr val="accent6">
+                <a:lumMod val="20000"/>
+                <a:lumOff val="80000"/>
+              </a:schemeClr>
+            </a:solidFill>
+          </a:ln>
+        </p:spPr>
+        <p:style>
+          <a:lnRef idx="2">
+            <a:schemeClr val="accent1">
+              <a:shade val="50000"/>
+            </a:schemeClr>
+          </a:lnRef>
+          <a:fillRef idx="1">
+            <a:schemeClr val="accent1"/>
+          </a:fillRef>
+          <a:effectRef idx="0">
+            <a:schemeClr val="accent1"/>
+          </a:effectRef>
+          <a:fontRef idx="minor">
+            <a:schemeClr val="lt1"/>
+          </a:fontRef>
+        </p:style>
+        <p:txBody>
+          <a:bodyPr rtlCol="0" anchor="ctr"/>
+          <a:lstStyle/>
+          <a:p>
+            <a:pPr algn="ctr"/>
+            <a:endParaRPr kumimoji="1" lang="ja-JP" altLang="en-US"/>
+          </a:p>
+        </p:txBody>
+      </p:sp>
+      <p:sp>
+        <p:nvSpPr>
+          <p:cNvPr id="44" name="テキスト ボックス 43">
+            <a:extLst>
+              <a:ext uri="{FF2B5EF4-FFF2-40B4-BE49-F238E27FC236}">
+                <a16:creationId xmlns:a16="http://schemas.microsoft.com/office/drawing/2014/main" id="{A394B101-D193-4BE5-BC70-7DFF10ACA4CE}"/>
+              </a:ext>
+            </a:extLst>
+          </p:cNvPr>
+          <p:cNvSpPr txBox="1"/>
+          <p:nvPr/>
+        </p:nvSpPr>
+        <p:spPr>
+          <a:xfrm>
+            <a:off x="5779324" y="1399178"/>
+            <a:ext cx="1354858" cy="338554"/>
+          </a:xfrm>
+          <a:prstGeom prst="rect">
+            <a:avLst/>
+          </a:prstGeom>
+          <a:noFill/>
+        </p:spPr>
+        <p:txBody>
+          <a:bodyPr wrap="none" rtlCol="0">
+            <a:spAutoFit/>
+          </a:bodyPr>
+          <a:lstStyle/>
+          <a:p>
+            <a:r>
+              <a:rPr kumimoji="1" lang="en-US" altLang="ja-JP" sz="1600" b="1" dirty="0"/>
+              <a:t>Client</a:t>
+            </a:r>
+            <a:r>
+              <a:rPr kumimoji="1" lang="ja-JP" altLang="en-US" sz="1600" b="1" dirty="0"/>
+              <a:t> </a:t>
+            </a:r>
+            <a:r>
+              <a:rPr kumimoji="1" lang="en-US" altLang="ja-JP" sz="1600" b="1" dirty="0"/>
+              <a:t>Hello</a:t>
             </a:r>
             <a:endParaRPr kumimoji="1" lang="ja-JP" altLang="en-US" sz="1600" b="1" dirty="0"/>
           </a:p>
@@ -25325,7 +25501,7 @@
         <p:fade/>
       </p:transition>
     </mc:Choice>
-    <mc:Fallback xmlns="" xmlns:mv="urn:schemas-microsoft-com:mac:vml" xmlns:c="http://schemas.openxmlformats.org/drawingml/2006/chart" xmlns:dgm="http://schemas.openxmlformats.org/drawingml/2006/diagram" xmlns:o="urn:schemas-microsoft-com:office:office" xmlns:v="urn:schemas-microsoft-com:vml" xmlns:pvml="urn:schemas-microsoft-com:office:powerpoint" xmlns:com="http://schemas.openxmlformats.org/drawingml/2006/compatibility" xmlns:p15="http://schemas.microsoft.com/office/powerpoint/2012/main" xmlns:ahyp="http://schemas.microsoft.com/office/drawing/2018/hyperlinkcolor">
+    <mc:Fallback xmlns:ahyp="http://schemas.microsoft.com/office/drawing/2018/hyperlinkcolor" xmlns:p15="http://schemas.microsoft.com/office/powerpoint/2012/main" xmlns:com="http://schemas.openxmlformats.org/drawingml/2006/compatibility" xmlns:pvml="urn:schemas-microsoft-com:office:powerpoint" xmlns:v="urn:schemas-microsoft-com:vml" xmlns:o="urn:schemas-microsoft-com:office:office" xmlns:dgm="http://schemas.openxmlformats.org/drawingml/2006/diagram" xmlns:c="http://schemas.openxmlformats.org/drawingml/2006/chart" xmlns:mv="urn:schemas-microsoft-com:mac:vml" xmlns="">
       <p:transition spd="slow">
         <p:fade/>
       </p:transition>
@@ -25793,7 +25969,7 @@
         <p:fade/>
       </p:transition>
     </mc:Choice>
-    <mc:Fallback xmlns="" xmlns:mv="urn:schemas-microsoft-com:mac:vml" xmlns:c="http://schemas.openxmlformats.org/drawingml/2006/chart" xmlns:dgm="http://schemas.openxmlformats.org/drawingml/2006/diagram" xmlns:o="urn:schemas-microsoft-com:office:office" xmlns:v="urn:schemas-microsoft-com:vml" xmlns:pvml="urn:schemas-microsoft-com:office:powerpoint" xmlns:com="http://schemas.openxmlformats.org/drawingml/2006/compatibility" xmlns:p15="http://schemas.microsoft.com/office/powerpoint/2012/main" xmlns:ahyp="http://schemas.microsoft.com/office/drawing/2018/hyperlinkcolor">
+    <mc:Fallback xmlns:ahyp="http://schemas.microsoft.com/office/drawing/2018/hyperlinkcolor" xmlns:p15="http://schemas.microsoft.com/office/powerpoint/2012/main" xmlns:com="http://schemas.openxmlformats.org/drawingml/2006/compatibility" xmlns:pvml="urn:schemas-microsoft-com:office:powerpoint" xmlns:v="urn:schemas-microsoft-com:vml" xmlns:o="urn:schemas-microsoft-com:office:office" xmlns:dgm="http://schemas.openxmlformats.org/drawingml/2006/diagram" xmlns:c="http://schemas.openxmlformats.org/drawingml/2006/chart" xmlns:mv="urn:schemas-microsoft-com:mac:vml" xmlns="">
       <p:transition spd="slow">
         <p:fade/>
       </p:transition>
@@ -27717,7 +27893,7 @@
         <p:fade/>
       </p:transition>
     </mc:Choice>
-    <mc:Fallback xmlns="" xmlns:mv="urn:schemas-microsoft-com:mac:vml" xmlns:c="http://schemas.openxmlformats.org/drawingml/2006/chart" xmlns:dgm="http://schemas.openxmlformats.org/drawingml/2006/diagram" xmlns:o="urn:schemas-microsoft-com:office:office" xmlns:v="urn:schemas-microsoft-com:vml" xmlns:pvml="urn:schemas-microsoft-com:office:powerpoint" xmlns:com="http://schemas.openxmlformats.org/drawingml/2006/compatibility" xmlns:p15="http://schemas.microsoft.com/office/powerpoint/2012/main" xmlns:ahyp="http://schemas.microsoft.com/office/drawing/2018/hyperlinkcolor">
+    <mc:Fallback xmlns:ahyp="http://schemas.microsoft.com/office/drawing/2018/hyperlinkcolor" xmlns:p15="http://schemas.microsoft.com/office/powerpoint/2012/main" xmlns:com="http://schemas.openxmlformats.org/drawingml/2006/compatibility" xmlns:pvml="urn:schemas-microsoft-com:office:powerpoint" xmlns:v="urn:schemas-microsoft-com:vml" xmlns:o="urn:schemas-microsoft-com:office:office" xmlns:dgm="http://schemas.openxmlformats.org/drawingml/2006/diagram" xmlns:c="http://schemas.openxmlformats.org/drawingml/2006/chart" xmlns:mv="urn:schemas-microsoft-com:mac:vml" xmlns="">
       <p:transition spd="slow">
         <p:fade/>
       </p:transition>

</xml_diff>

<commit_message>
Ch2 Protocol Suite and Key Agreement
</commit_message>
<xml_diff>
--- a/Resource/Part1.Technology/Chapter2.Protocol/1.2.2-keyAgree.pptx
+++ b/Resource/Part1.Technology/Chapter2.Protocol/1.2.2-keyAgree.pptx
@@ -16686,7 +16686,12 @@
             <p:ph type="title"/>
           </p:nvPr>
         </p:nvSpPr>
-        <p:spPr/>
+        <p:spPr>
+          <a:xfrm>
+            <a:off x="795885" y="126800"/>
+            <a:ext cx="10515600" cy="1325563"/>
+          </a:xfrm>
+        </p:spPr>
         <p:txBody>
           <a:bodyPr/>
           <a:lstStyle/>
@@ -19024,7 +19029,12 @@
             <p:ph type="title"/>
           </p:nvPr>
         </p:nvSpPr>
-        <p:spPr/>
+        <p:spPr>
+          <a:xfrm>
+            <a:off x="838200" y="46959"/>
+            <a:ext cx="10515600" cy="1325563"/>
+          </a:xfrm>
+        </p:spPr>
         <p:txBody>
           <a:bodyPr/>
           <a:lstStyle/>

</xml_diff>